<commit_message>
presentation finished and PDF now in git
</commit_message>
<xml_diff>
--- a/pres.pptx
+++ b/pres.pptx
@@ -10,6 +10,9 @@
     <p:sldId id="262" r:id="rId4"/>
     <p:sldId id="263" r:id="rId5"/>
     <p:sldId id="264" r:id="rId6"/>
+    <p:sldId id="265" r:id="rId7"/>
+    <p:sldId id="266" r:id="rId8"/>
+    <p:sldId id="267" r:id="rId9"/>
   </p:sldIdLst>
   <p:sldSz cx="9144000" cy="5143500" type="screen16x9"/>
   <p:notesSz cx="6858000" cy="9144000"/>
@@ -3568,8 +3571,8 @@
         </p:nvSpPr>
         <p:spPr>
           <a:xfrm>
-            <a:off x="3248708" y="3437792"/>
-            <a:ext cx="2635006" cy="646331"/>
+            <a:off x="3236986" y="3437792"/>
+            <a:ext cx="2658450" cy="646331"/>
           </a:xfrm>
           <a:prstGeom prst="rect">
             <a:avLst/>
@@ -3616,7 +3619,31 @@
                   <a:srgbClr val="B2B2B2"/>
                 </a:solidFill>
               </a:rPr>
-              <a:t>&amp; A dumb Luck </a:t>
+              <a:t>&amp; </a:t>
+            </a:r>
+            <a:r>
+              <a:rPr lang="en-US" dirty="0" smtClean="0">
+                <a:solidFill>
+                  <a:srgbClr val="B2B2B2"/>
+                </a:solidFill>
+              </a:rPr>
+              <a:t>a Dumb </a:t>
+            </a:r>
+            <a:r>
+              <a:rPr lang="en-US" dirty="0">
+                <a:solidFill>
+                  <a:srgbClr val="B2B2B2"/>
+                </a:solidFill>
+              </a:rPr>
+              <a:t>L</a:t>
+            </a:r>
+            <a:r>
+              <a:rPr lang="en-US" dirty="0" smtClean="0">
+                <a:solidFill>
+                  <a:srgbClr val="B2B2B2"/>
+                </a:solidFill>
+              </a:rPr>
+              <a:t>uck </a:t>
             </a:r>
             <a:r>
               <a:rPr lang="en-US" dirty="0">
@@ -3634,6 +3661,11 @@
               </a:rPr>
               <a:t>lgorithm</a:t>
             </a:r>
+            <a:endParaRPr lang="en-US" dirty="0" smtClean="0">
+              <a:solidFill>
+                <a:srgbClr val="B2B2B2"/>
+              </a:solidFill>
+            </a:endParaRPr>
           </a:p>
         </p:txBody>
       </p:sp>
@@ -3842,8 +3874,21 @@
                   <a:srgbClr val="B2B2B2"/>
                 </a:solidFill>
               </a:rPr>
-              <a:t>We switched to:</a:t>
+              <a:t>We switched </a:t>
             </a:r>
+            <a:r>
+              <a:rPr lang="en-US" dirty="0" smtClean="0">
+                <a:solidFill>
+                  <a:srgbClr val="B2B2B2"/>
+                </a:solidFill>
+              </a:rPr>
+              <a:t>to</a:t>
+            </a:r>
+            <a:endParaRPr lang="en-US" dirty="0" smtClean="0">
+              <a:solidFill>
+                <a:srgbClr val="B2B2B2"/>
+              </a:solidFill>
+            </a:endParaRPr>
           </a:p>
           <a:p>
             <a:pPr algn="ctr"/>
@@ -4158,6 +4203,923 @@
     <p:extLst>
       <p:ext uri="{BB962C8B-B14F-4D97-AF65-F5344CB8AC3E}">
         <p14:creationId xmlns:p14="http://schemas.microsoft.com/office/powerpoint/2010/main" val="1739077327"/>
+      </p:ext>
+    </p:extLst>
+  </p:cSld>
+  <p:clrMapOvr>
+    <a:masterClrMapping/>
+  </p:clrMapOvr>
+  <p:timing>
+    <p:tnLst>
+      <p:par>
+        <p:cTn xmlns:p14="http://schemas.microsoft.com/office/powerpoint/2010/main" id="1" dur="indefinite" restart="never" nodeType="tmRoot"/>
+      </p:par>
+    </p:tnLst>
+  </p:timing>
+</p:sld>
+</file>
+
+<file path=ppt/slides/slide6.xml><?xml version="1.0" encoding="utf-8"?>
+<p:sld xmlns:a="http://schemas.openxmlformats.org/drawingml/2006/main" xmlns:r="http://schemas.openxmlformats.org/officeDocument/2006/relationships" xmlns:p="http://schemas.openxmlformats.org/presentationml/2006/main">
+  <p:cSld>
+    <p:bg>
+      <p:bgPr>
+        <a:solidFill>
+          <a:srgbClr val="1D1E1A"/>
+        </a:solidFill>
+        <a:effectLst/>
+      </p:bgPr>
+    </p:bg>
+    <p:spTree>
+      <p:nvGrpSpPr>
+        <p:cNvPr id="1" name=""/>
+        <p:cNvGrpSpPr/>
+        <p:nvPr/>
+      </p:nvGrpSpPr>
+      <p:grpSpPr>
+        <a:xfrm>
+          <a:off x="0" y="0"/>
+          <a:ext cx="0" cy="0"/>
+          <a:chOff x="0" y="0"/>
+          <a:chExt cx="0" cy="0"/>
+        </a:xfrm>
+      </p:grpSpPr>
+      <p:sp>
+        <p:nvSpPr>
+          <p:cNvPr id="3" name="Title 2"/>
+          <p:cNvSpPr>
+            <a:spLocks noGrp="1"/>
+          </p:cNvSpPr>
+          <p:nvPr>
+            <p:ph type="title"/>
+          </p:nvPr>
+        </p:nvSpPr>
+        <p:spPr/>
+        <p:txBody>
+          <a:bodyPr>
+            <a:normAutofit/>
+          </a:bodyPr>
+          <a:lstStyle/>
+          <a:p>
+            <a:pPr algn="ctr"/>
+            <a:r>
+              <a:rPr lang="en-US" dirty="0" smtClean="0"/>
+              <a:t>Held-Out Data</a:t>
+            </a:r>
+            <a:endParaRPr lang="en-US" dirty="0"/>
+          </a:p>
+        </p:txBody>
+      </p:sp>
+      <p:sp>
+        <p:nvSpPr>
+          <p:cNvPr id="2" name="TextBox 1"/>
+          <p:cNvSpPr txBox="1"/>
+          <p:nvPr/>
+        </p:nvSpPr>
+        <p:spPr>
+          <a:xfrm>
+            <a:off x="1234301" y="1070133"/>
+            <a:ext cx="778090" cy="369332"/>
+          </a:xfrm>
+          <a:prstGeom prst="rect">
+            <a:avLst/>
+          </a:prstGeom>
+          <a:noFill/>
+        </p:spPr>
+        <p:txBody>
+          <a:bodyPr wrap="none" rtlCol="0">
+            <a:spAutoFit/>
+          </a:bodyPr>
+          <a:lstStyle/>
+          <a:p>
+            <a:r>
+              <a:rPr lang="en-US" dirty="0" smtClean="0">
+                <a:solidFill>
+                  <a:srgbClr val="B2B2B2"/>
+                </a:solidFill>
+              </a:rPr>
+              <a:t>Recall</a:t>
+            </a:r>
+            <a:endParaRPr lang="en-US" dirty="0">
+              <a:solidFill>
+                <a:srgbClr val="B2B2B2"/>
+              </a:solidFill>
+            </a:endParaRPr>
+          </a:p>
+        </p:txBody>
+      </p:sp>
+      <p:sp>
+        <p:nvSpPr>
+          <p:cNvPr id="13" name="Title 2"/>
+          <p:cNvSpPr txBox="1">
+            <a:spLocks/>
+          </p:cNvSpPr>
+          <p:nvPr/>
+        </p:nvSpPr>
+        <p:spPr>
+          <a:xfrm>
+            <a:off x="1619576" y="2645799"/>
+            <a:ext cx="5900390" cy="1598255"/>
+          </a:xfrm>
+          <a:prstGeom prst="rect">
+            <a:avLst/>
+          </a:prstGeom>
+          <a:ln w="6350" cap="rnd">
+            <a:noFill/>
+          </a:ln>
+        </p:spPr>
+        <p:txBody>
+          <a:bodyPr vert="horz" rtlCol="0" anchor="ctr" anchorCtr="0">
+            <a:noAutofit/>
+          </a:bodyPr>
+          <a:lstStyle>
+            <a:lvl1pPr algn="l" rtl="0" eaLnBrk="1" latinLnBrk="0" hangingPunct="1">
+              <a:spcBef>
+                <a:spcPct val="0"/>
+              </a:spcBef>
+              <a:buNone/>
+              <a:defRPr kumimoji="0" lang="en-US" sz="4200" b="0" kern="1200" spc="-100" baseline="0" dirty="0">
+                <a:ln w="3200">
+                  <a:solidFill>
+                    <a:schemeClr val="bg2">
+                      <a:shade val="75000"/>
+                      <a:alpha val="25000"/>
+                    </a:schemeClr>
+                  </a:solidFill>
+                  <a:prstDash val="solid"/>
+                  <a:round/>
+                </a:ln>
+                <a:solidFill>
+                  <a:srgbClr val="F9F9F9"/>
+                </a:solidFill>
+                <a:effectLst>
+                  <a:innerShdw blurRad="50800" dist="25400" dir="13500000">
+                    <a:prstClr val="black">
+                      <a:alpha val="70000"/>
+                    </a:prstClr>
+                  </a:innerShdw>
+                </a:effectLst>
+                <a:latin typeface="+mj-lt"/>
+                <a:ea typeface="+mj-ea"/>
+                <a:cs typeface="+mj-cs"/>
+              </a:defRPr>
+            </a:lvl1pPr>
+          </a:lstStyle>
+          <a:p>
+            <a:pPr algn="ctr"/>
+            <a:r>
+              <a:rPr lang="en-US" sz="12000" dirty="0" smtClean="0">
+                <a:solidFill>
+                  <a:schemeClr val="tx1"/>
+                </a:solidFill>
+              </a:rPr>
+              <a:t>63.8%</a:t>
+            </a:r>
+            <a:endParaRPr lang="en-US" sz="12000" dirty="0">
+              <a:solidFill>
+                <a:schemeClr val="tx1"/>
+              </a:solidFill>
+            </a:endParaRPr>
+          </a:p>
+        </p:txBody>
+      </p:sp>
+      <p:sp>
+        <p:nvSpPr>
+          <p:cNvPr id="14" name="Title 2"/>
+          <p:cNvSpPr txBox="1">
+            <a:spLocks/>
+          </p:cNvSpPr>
+          <p:nvPr/>
+        </p:nvSpPr>
+        <p:spPr>
+          <a:xfrm>
+            <a:off x="0" y="1068038"/>
+            <a:ext cx="3253420" cy="1598255"/>
+          </a:xfrm>
+          <a:prstGeom prst="rect">
+            <a:avLst/>
+          </a:prstGeom>
+          <a:ln w="6350" cap="rnd">
+            <a:noFill/>
+          </a:ln>
+        </p:spPr>
+        <p:txBody>
+          <a:bodyPr vert="horz" rtlCol="0" anchor="ctr" anchorCtr="0">
+            <a:noAutofit/>
+          </a:bodyPr>
+          <a:lstStyle>
+            <a:lvl1pPr algn="l" rtl="0" eaLnBrk="1" latinLnBrk="0" hangingPunct="1">
+              <a:spcBef>
+                <a:spcPct val="0"/>
+              </a:spcBef>
+              <a:buNone/>
+              <a:defRPr kumimoji="0" lang="en-US" sz="4200" b="0" kern="1200" spc="-100" baseline="0" dirty="0">
+                <a:ln w="3200">
+                  <a:solidFill>
+                    <a:schemeClr val="bg2">
+                      <a:shade val="75000"/>
+                      <a:alpha val="25000"/>
+                    </a:schemeClr>
+                  </a:solidFill>
+                  <a:prstDash val="solid"/>
+                  <a:round/>
+                </a:ln>
+                <a:solidFill>
+                  <a:srgbClr val="F9F9F9"/>
+                </a:solidFill>
+                <a:effectLst>
+                  <a:innerShdw blurRad="50800" dist="25400" dir="13500000">
+                    <a:prstClr val="black">
+                      <a:alpha val="70000"/>
+                    </a:prstClr>
+                  </a:innerShdw>
+                </a:effectLst>
+                <a:latin typeface="+mj-lt"/>
+                <a:ea typeface="+mj-ea"/>
+                <a:cs typeface="+mj-cs"/>
+              </a:defRPr>
+            </a:lvl1pPr>
+          </a:lstStyle>
+          <a:p>
+            <a:pPr algn="ctr"/>
+            <a:r>
+              <a:rPr lang="en-US" sz="6000" dirty="0" smtClean="0">
+                <a:solidFill>
+                  <a:srgbClr val="B2B2B2"/>
+                </a:solidFill>
+              </a:rPr>
+              <a:t>64.4%</a:t>
+            </a:r>
+            <a:endParaRPr lang="en-US" sz="6000" dirty="0">
+              <a:solidFill>
+                <a:srgbClr val="B2B2B2"/>
+              </a:solidFill>
+            </a:endParaRPr>
+          </a:p>
+        </p:txBody>
+      </p:sp>
+      <p:sp>
+        <p:nvSpPr>
+          <p:cNvPr id="15" name="TextBox 14"/>
+          <p:cNvSpPr txBox="1"/>
+          <p:nvPr/>
+        </p:nvSpPr>
+        <p:spPr>
+          <a:xfrm>
+            <a:off x="6982188" y="1070133"/>
+            <a:ext cx="1075535" cy="369332"/>
+          </a:xfrm>
+          <a:prstGeom prst="rect">
+            <a:avLst/>
+          </a:prstGeom>
+          <a:noFill/>
+        </p:spPr>
+        <p:txBody>
+          <a:bodyPr wrap="none" rtlCol="0">
+            <a:spAutoFit/>
+          </a:bodyPr>
+          <a:lstStyle/>
+          <a:p>
+            <a:r>
+              <a:rPr lang="en-US" dirty="0" smtClean="0">
+                <a:solidFill>
+                  <a:schemeClr val="accent2"/>
+                </a:solidFill>
+              </a:rPr>
+              <a:t>Precision</a:t>
+            </a:r>
+            <a:endParaRPr lang="en-US" dirty="0">
+              <a:solidFill>
+                <a:schemeClr val="accent2"/>
+              </a:solidFill>
+            </a:endParaRPr>
+          </a:p>
+        </p:txBody>
+      </p:sp>
+      <p:sp>
+        <p:nvSpPr>
+          <p:cNvPr id="16" name="Title 2"/>
+          <p:cNvSpPr txBox="1">
+            <a:spLocks/>
+          </p:cNvSpPr>
+          <p:nvPr/>
+        </p:nvSpPr>
+        <p:spPr>
+          <a:xfrm>
+            <a:off x="5890580" y="1068038"/>
+            <a:ext cx="3253420" cy="1598255"/>
+          </a:xfrm>
+          <a:prstGeom prst="rect">
+            <a:avLst/>
+          </a:prstGeom>
+          <a:ln w="6350" cap="rnd">
+            <a:noFill/>
+          </a:ln>
+        </p:spPr>
+        <p:txBody>
+          <a:bodyPr vert="horz" rtlCol="0" anchor="ctr" anchorCtr="0">
+            <a:noAutofit/>
+          </a:bodyPr>
+          <a:lstStyle>
+            <a:lvl1pPr algn="l" rtl="0" eaLnBrk="1" latinLnBrk="0" hangingPunct="1">
+              <a:spcBef>
+                <a:spcPct val="0"/>
+              </a:spcBef>
+              <a:buNone/>
+              <a:defRPr kumimoji="0" lang="en-US" sz="4200" b="0" kern="1200" spc="-100" baseline="0" dirty="0">
+                <a:ln w="3200">
+                  <a:solidFill>
+                    <a:schemeClr val="bg2">
+                      <a:shade val="75000"/>
+                      <a:alpha val="25000"/>
+                    </a:schemeClr>
+                  </a:solidFill>
+                  <a:prstDash val="solid"/>
+                  <a:round/>
+                </a:ln>
+                <a:solidFill>
+                  <a:srgbClr val="F9F9F9"/>
+                </a:solidFill>
+                <a:effectLst>
+                  <a:innerShdw blurRad="50800" dist="25400" dir="13500000">
+                    <a:prstClr val="black">
+                      <a:alpha val="70000"/>
+                    </a:prstClr>
+                  </a:innerShdw>
+                </a:effectLst>
+                <a:latin typeface="+mj-lt"/>
+                <a:ea typeface="+mj-ea"/>
+                <a:cs typeface="+mj-cs"/>
+              </a:defRPr>
+            </a:lvl1pPr>
+          </a:lstStyle>
+          <a:p>
+            <a:pPr algn="ctr"/>
+            <a:r>
+              <a:rPr lang="en-US" sz="6000" dirty="0" smtClean="0">
+                <a:solidFill>
+                  <a:srgbClr val="B2B2B2"/>
+                </a:solidFill>
+              </a:rPr>
+              <a:t>63.2%</a:t>
+            </a:r>
+            <a:endParaRPr lang="en-US" sz="6000" dirty="0">
+              <a:solidFill>
+                <a:srgbClr val="B2B2B2"/>
+              </a:solidFill>
+            </a:endParaRPr>
+          </a:p>
+        </p:txBody>
+      </p:sp>
+      <p:sp>
+        <p:nvSpPr>
+          <p:cNvPr id="17" name="TextBox 16"/>
+          <p:cNvSpPr txBox="1"/>
+          <p:nvPr/>
+        </p:nvSpPr>
+        <p:spPr>
+          <a:xfrm>
+            <a:off x="4188064" y="2481627"/>
+            <a:ext cx="890350" cy="369332"/>
+          </a:xfrm>
+          <a:prstGeom prst="rect">
+            <a:avLst/>
+          </a:prstGeom>
+          <a:noFill/>
+        </p:spPr>
+        <p:txBody>
+          <a:bodyPr wrap="none" rtlCol="0">
+            <a:spAutoFit/>
+          </a:bodyPr>
+          <a:lstStyle/>
+          <a:p>
+            <a:r>
+              <a:rPr lang="en-US" dirty="0" smtClean="0">
+                <a:solidFill>
+                  <a:schemeClr val="accent2"/>
+                </a:solidFill>
+              </a:rPr>
+              <a:t>F-score</a:t>
+            </a:r>
+            <a:endParaRPr lang="en-US" dirty="0">
+              <a:solidFill>
+                <a:schemeClr val="accent2"/>
+              </a:solidFill>
+            </a:endParaRPr>
+          </a:p>
+        </p:txBody>
+      </p:sp>
+    </p:spTree>
+    <p:extLst>
+      <p:ext uri="{BB962C8B-B14F-4D97-AF65-F5344CB8AC3E}">
+        <p14:creationId xmlns:p14="http://schemas.microsoft.com/office/powerpoint/2010/main" val="979289750"/>
+      </p:ext>
+    </p:extLst>
+  </p:cSld>
+  <p:clrMapOvr>
+    <a:masterClrMapping/>
+  </p:clrMapOvr>
+  <p:timing>
+    <p:tnLst>
+      <p:par>
+        <p:cTn xmlns:p14="http://schemas.microsoft.com/office/powerpoint/2010/main" id="1" dur="indefinite" restart="never" nodeType="tmRoot"/>
+      </p:par>
+    </p:tnLst>
+  </p:timing>
+</p:sld>
+</file>
+
+<file path=ppt/slides/slide7.xml><?xml version="1.0" encoding="utf-8"?>
+<p:sld xmlns:a="http://schemas.openxmlformats.org/drawingml/2006/main" xmlns:r="http://schemas.openxmlformats.org/officeDocument/2006/relationships" xmlns:p="http://schemas.openxmlformats.org/presentationml/2006/main">
+  <p:cSld>
+    <p:bg>
+      <p:bgPr>
+        <a:solidFill>
+          <a:srgbClr val="1D1E1A"/>
+        </a:solidFill>
+        <a:effectLst/>
+      </p:bgPr>
+    </p:bg>
+    <p:spTree>
+      <p:nvGrpSpPr>
+        <p:cNvPr id="1" name=""/>
+        <p:cNvGrpSpPr/>
+        <p:nvPr/>
+      </p:nvGrpSpPr>
+      <p:grpSpPr>
+        <a:xfrm>
+          <a:off x="0" y="0"/>
+          <a:ext cx="0" cy="0"/>
+          <a:chOff x="0" y="0"/>
+          <a:chExt cx="0" cy="0"/>
+        </a:xfrm>
+      </p:grpSpPr>
+      <p:sp>
+        <p:nvSpPr>
+          <p:cNvPr id="3" name="Title 2"/>
+          <p:cNvSpPr>
+            <a:spLocks noGrp="1"/>
+          </p:cNvSpPr>
+          <p:nvPr>
+            <p:ph type="title"/>
+          </p:nvPr>
+        </p:nvSpPr>
+        <p:spPr/>
+        <p:txBody>
+          <a:bodyPr>
+            <a:normAutofit/>
+          </a:bodyPr>
+          <a:lstStyle/>
+          <a:p>
+            <a:pPr algn="ctr"/>
+            <a:r>
+              <a:rPr lang="en-US" dirty="0" smtClean="0"/>
+              <a:t>Reflections</a:t>
+            </a:r>
+            <a:endParaRPr lang="en-US" dirty="0"/>
+          </a:p>
+        </p:txBody>
+      </p:sp>
+      <p:sp>
+        <p:nvSpPr>
+          <p:cNvPr id="13" name="Title 2"/>
+          <p:cNvSpPr txBox="1">
+            <a:spLocks/>
+          </p:cNvSpPr>
+          <p:nvPr/>
+        </p:nvSpPr>
+        <p:spPr>
+          <a:xfrm>
+            <a:off x="2940073" y="1846672"/>
+            <a:ext cx="3253420" cy="1598255"/>
+          </a:xfrm>
+          <a:prstGeom prst="rect">
+            <a:avLst/>
+          </a:prstGeom>
+          <a:ln w="6350" cap="rnd">
+            <a:noFill/>
+          </a:ln>
+        </p:spPr>
+        <p:txBody>
+          <a:bodyPr vert="horz" rtlCol="0" anchor="ctr" anchorCtr="0">
+            <a:noAutofit/>
+          </a:bodyPr>
+          <a:lstStyle>
+            <a:lvl1pPr algn="l" rtl="0" eaLnBrk="1" latinLnBrk="0" hangingPunct="1">
+              <a:spcBef>
+                <a:spcPct val="0"/>
+              </a:spcBef>
+              <a:buNone/>
+              <a:defRPr kumimoji="0" lang="en-US" sz="4200" b="0" kern="1200" spc="-100" baseline="0" dirty="0">
+                <a:ln w="3200">
+                  <a:solidFill>
+                    <a:schemeClr val="bg2">
+                      <a:shade val="75000"/>
+                      <a:alpha val="25000"/>
+                    </a:schemeClr>
+                  </a:solidFill>
+                  <a:prstDash val="solid"/>
+                  <a:round/>
+                </a:ln>
+                <a:solidFill>
+                  <a:srgbClr val="F9F9F9"/>
+                </a:solidFill>
+                <a:effectLst>
+                  <a:innerShdw blurRad="50800" dist="25400" dir="13500000">
+                    <a:prstClr val="black">
+                      <a:alpha val="70000"/>
+                    </a:prstClr>
+                  </a:innerShdw>
+                </a:effectLst>
+                <a:latin typeface="+mj-lt"/>
+                <a:ea typeface="+mj-ea"/>
+                <a:cs typeface="+mj-cs"/>
+              </a:defRPr>
+            </a:lvl1pPr>
+          </a:lstStyle>
+          <a:p>
+            <a:pPr algn="ctr"/>
+            <a:r>
+              <a:rPr lang="en-US" sz="12000" dirty="0" smtClean="0">
+                <a:solidFill>
+                  <a:schemeClr val="tx1"/>
+                </a:solidFill>
+              </a:rPr>
+              <a:t>Q?</a:t>
+            </a:r>
+            <a:endParaRPr lang="en-US" sz="12000" dirty="0">
+              <a:solidFill>
+                <a:schemeClr val="tx1"/>
+              </a:solidFill>
+            </a:endParaRPr>
+          </a:p>
+        </p:txBody>
+      </p:sp>
+      <p:sp>
+        <p:nvSpPr>
+          <p:cNvPr id="14" name="TextBox 13"/>
+          <p:cNvSpPr txBox="1"/>
+          <p:nvPr/>
+        </p:nvSpPr>
+        <p:spPr>
+          <a:xfrm>
+            <a:off x="2660071" y="3453548"/>
+            <a:ext cx="3812274" cy="646331"/>
+          </a:xfrm>
+          <a:prstGeom prst="rect">
+            <a:avLst/>
+          </a:prstGeom>
+          <a:noFill/>
+        </p:spPr>
+        <p:txBody>
+          <a:bodyPr wrap="none" rtlCol="0">
+            <a:spAutoFit/>
+          </a:bodyPr>
+          <a:lstStyle/>
+          <a:p>
+            <a:pPr algn="ctr"/>
+            <a:r>
+              <a:rPr lang="en-US" dirty="0">
+                <a:solidFill>
+                  <a:srgbClr val="B2B2B2"/>
+                </a:solidFill>
+              </a:rPr>
+              <a:t>We don’t ‘know’ what the Q is asking</a:t>
+            </a:r>
+          </a:p>
+          <a:p>
+            <a:pPr algn="ctr"/>
+            <a:r>
+              <a:rPr lang="en-US" dirty="0">
+                <a:solidFill>
+                  <a:srgbClr val="B2B2B2"/>
+                </a:solidFill>
+              </a:rPr>
+              <a:t>We treat each ‘</a:t>
+            </a:r>
+            <a:r>
+              <a:rPr lang="en-US" dirty="0" err="1">
+                <a:solidFill>
+                  <a:srgbClr val="B2B2B2"/>
+                </a:solidFill>
+              </a:rPr>
+              <a:t>wh</a:t>
+            </a:r>
+            <a:r>
+              <a:rPr lang="en-US" dirty="0">
+                <a:solidFill>
+                  <a:srgbClr val="B2B2B2"/>
+                </a:solidFill>
+              </a:rPr>
+              <a:t>’ Q type accordingly</a:t>
+            </a:r>
+          </a:p>
+        </p:txBody>
+      </p:sp>
+    </p:spTree>
+    <p:extLst>
+      <p:ext uri="{BB962C8B-B14F-4D97-AF65-F5344CB8AC3E}">
+        <p14:creationId xmlns:p14="http://schemas.microsoft.com/office/powerpoint/2010/main" val="3128083753"/>
+      </p:ext>
+    </p:extLst>
+  </p:cSld>
+  <p:clrMapOvr>
+    <a:masterClrMapping/>
+  </p:clrMapOvr>
+  <p:timing>
+    <p:tnLst>
+      <p:par>
+        <p:cTn xmlns:p14="http://schemas.microsoft.com/office/powerpoint/2010/main" id="1" dur="indefinite" restart="never" nodeType="tmRoot"/>
+      </p:par>
+    </p:tnLst>
+  </p:timing>
+</p:sld>
+</file>
+
+<file path=ppt/slides/slide8.xml><?xml version="1.0" encoding="utf-8"?>
+<p:sld xmlns:a="http://schemas.openxmlformats.org/drawingml/2006/main" xmlns:r="http://schemas.openxmlformats.org/officeDocument/2006/relationships" xmlns:p="http://schemas.openxmlformats.org/presentationml/2006/main">
+  <p:cSld>
+    <p:bg>
+      <p:bgPr>
+        <a:solidFill>
+          <a:srgbClr val="1D1E1A"/>
+        </a:solidFill>
+        <a:effectLst/>
+      </p:bgPr>
+    </p:bg>
+    <p:spTree>
+      <p:nvGrpSpPr>
+        <p:cNvPr id="1" name=""/>
+        <p:cNvGrpSpPr/>
+        <p:nvPr/>
+      </p:nvGrpSpPr>
+      <p:grpSpPr>
+        <a:xfrm>
+          <a:off x="0" y="0"/>
+          <a:ext cx="0" cy="0"/>
+          <a:chOff x="0" y="0"/>
+          <a:chExt cx="0" cy="0"/>
+        </a:xfrm>
+      </p:grpSpPr>
+      <p:sp>
+        <p:nvSpPr>
+          <p:cNvPr id="3" name="Title 2"/>
+          <p:cNvSpPr>
+            <a:spLocks noGrp="1"/>
+          </p:cNvSpPr>
+          <p:nvPr>
+            <p:ph type="title"/>
+          </p:nvPr>
+        </p:nvSpPr>
+        <p:spPr/>
+        <p:txBody>
+          <a:bodyPr>
+            <a:normAutofit/>
+          </a:bodyPr>
+          <a:lstStyle/>
+          <a:p>
+            <a:pPr algn="ctr"/>
+            <a:r>
+              <a:rPr lang="en-US" dirty="0" smtClean="0"/>
+              <a:t>Observations</a:t>
+            </a:r>
+            <a:endParaRPr lang="en-US" dirty="0"/>
+          </a:p>
+        </p:txBody>
+      </p:sp>
+      <p:sp>
+        <p:nvSpPr>
+          <p:cNvPr id="4" name="TextBox 3"/>
+          <p:cNvSpPr txBox="1"/>
+          <p:nvPr/>
+        </p:nvSpPr>
+        <p:spPr>
+          <a:xfrm>
+            <a:off x="2516607" y="2254293"/>
+            <a:ext cx="4113462" cy="646331"/>
+          </a:xfrm>
+          <a:prstGeom prst="rect">
+            <a:avLst/>
+          </a:prstGeom>
+          <a:noFill/>
+        </p:spPr>
+        <p:txBody>
+          <a:bodyPr wrap="square" rtlCol="0">
+            <a:spAutoFit/>
+          </a:bodyPr>
+          <a:lstStyle/>
+          <a:p>
+            <a:pPr algn="ctr"/>
+            <a:r>
+              <a:rPr lang="en-US" dirty="0" smtClean="0">
+                <a:solidFill>
+                  <a:schemeClr val="accent2"/>
+                </a:solidFill>
+              </a:rPr>
+              <a:t>What Q is asking for &amp;</a:t>
+            </a:r>
+          </a:p>
+          <a:p>
+            <a:pPr algn="ctr"/>
+            <a:r>
+              <a:rPr lang="en-US" dirty="0" smtClean="0">
+                <a:solidFill>
+                  <a:schemeClr val="accent2"/>
+                </a:solidFill>
+              </a:rPr>
+              <a:t>Finding Best Sentence</a:t>
+            </a:r>
+          </a:p>
+        </p:txBody>
+      </p:sp>
+      <p:sp>
+        <p:nvSpPr>
+          <p:cNvPr id="5" name="Title 2"/>
+          <p:cNvSpPr txBox="1">
+            <a:spLocks/>
+          </p:cNvSpPr>
+          <p:nvPr/>
+        </p:nvSpPr>
+        <p:spPr>
+          <a:xfrm>
+            <a:off x="2946628" y="1422508"/>
+            <a:ext cx="3253420" cy="829472"/>
+          </a:xfrm>
+          <a:prstGeom prst="rect">
+            <a:avLst/>
+          </a:prstGeom>
+          <a:ln w="6350" cap="rnd">
+            <a:noFill/>
+          </a:ln>
+        </p:spPr>
+        <p:txBody>
+          <a:bodyPr vert="horz" rtlCol="0" anchor="ctr" anchorCtr="0">
+            <a:noAutofit/>
+          </a:bodyPr>
+          <a:lstStyle>
+            <a:lvl1pPr algn="l" rtl="0" eaLnBrk="1" latinLnBrk="0" hangingPunct="1">
+              <a:spcBef>
+                <a:spcPct val="0"/>
+              </a:spcBef>
+              <a:buNone/>
+              <a:defRPr kumimoji="0" lang="en-US" sz="4200" b="0" kern="1200" spc="-100" baseline="0" dirty="0">
+                <a:ln w="3200">
+                  <a:solidFill>
+                    <a:schemeClr val="bg2">
+                      <a:shade val="75000"/>
+                      <a:alpha val="25000"/>
+                    </a:schemeClr>
+                  </a:solidFill>
+                  <a:prstDash val="solid"/>
+                  <a:round/>
+                </a:ln>
+                <a:solidFill>
+                  <a:srgbClr val="F9F9F9"/>
+                </a:solidFill>
+                <a:effectLst>
+                  <a:innerShdw blurRad="50800" dist="25400" dir="13500000">
+                    <a:prstClr val="black">
+                      <a:alpha val="70000"/>
+                    </a:prstClr>
+                  </a:innerShdw>
+                </a:effectLst>
+                <a:latin typeface="+mj-lt"/>
+                <a:ea typeface="+mj-ea"/>
+                <a:cs typeface="+mj-cs"/>
+              </a:defRPr>
+            </a:lvl1pPr>
+          </a:lstStyle>
+          <a:p>
+            <a:pPr algn="ctr"/>
+            <a:r>
+              <a:rPr lang="en-US" sz="6000" dirty="0" smtClean="0">
+                <a:solidFill>
+                  <a:srgbClr val="FFFFFF"/>
+                </a:solidFill>
+              </a:rPr>
+              <a:t>Recall</a:t>
+            </a:r>
+          </a:p>
+        </p:txBody>
+      </p:sp>
+      <p:sp>
+        <p:nvSpPr>
+          <p:cNvPr id="6" name="TextBox 5"/>
+          <p:cNvSpPr txBox="1"/>
+          <p:nvPr/>
+        </p:nvSpPr>
+        <p:spPr>
+          <a:xfrm>
+            <a:off x="2516607" y="3716561"/>
+            <a:ext cx="4113462" cy="369332"/>
+          </a:xfrm>
+          <a:prstGeom prst="rect">
+            <a:avLst/>
+          </a:prstGeom>
+          <a:noFill/>
+        </p:spPr>
+        <p:txBody>
+          <a:bodyPr wrap="square" rtlCol="0">
+            <a:spAutoFit/>
+          </a:bodyPr>
+          <a:lstStyle/>
+          <a:p>
+            <a:pPr algn="ctr"/>
+            <a:r>
+              <a:rPr lang="en-US" dirty="0">
+                <a:solidFill>
+                  <a:schemeClr val="accent2"/>
+                </a:solidFill>
+              </a:rPr>
+              <a:t>Answering Q</a:t>
+            </a:r>
+            <a:endParaRPr lang="en-US" dirty="0">
+              <a:solidFill>
+                <a:schemeClr val="accent2"/>
+              </a:solidFill>
+            </a:endParaRPr>
+          </a:p>
+        </p:txBody>
+      </p:sp>
+      <p:sp>
+        <p:nvSpPr>
+          <p:cNvPr id="7" name="Title 2"/>
+          <p:cNvSpPr txBox="1">
+            <a:spLocks/>
+          </p:cNvSpPr>
+          <p:nvPr/>
+        </p:nvSpPr>
+        <p:spPr>
+          <a:xfrm>
+            <a:off x="2946628" y="2905955"/>
+            <a:ext cx="3253420" cy="808068"/>
+          </a:xfrm>
+          <a:prstGeom prst="rect">
+            <a:avLst/>
+          </a:prstGeom>
+          <a:ln w="6350" cap="rnd">
+            <a:noFill/>
+          </a:ln>
+        </p:spPr>
+        <p:txBody>
+          <a:bodyPr vert="horz" rtlCol="0" anchor="ctr" anchorCtr="0">
+            <a:noAutofit/>
+          </a:bodyPr>
+          <a:lstStyle>
+            <a:lvl1pPr algn="l" rtl="0" eaLnBrk="1" latinLnBrk="0" hangingPunct="1">
+              <a:spcBef>
+                <a:spcPct val="0"/>
+              </a:spcBef>
+              <a:buNone/>
+              <a:defRPr kumimoji="0" lang="en-US" sz="4200" b="0" kern="1200" spc="-100" baseline="0" dirty="0">
+                <a:ln w="3200">
+                  <a:solidFill>
+                    <a:schemeClr val="bg2">
+                      <a:shade val="75000"/>
+                      <a:alpha val="25000"/>
+                    </a:schemeClr>
+                  </a:solidFill>
+                  <a:prstDash val="solid"/>
+                  <a:round/>
+                </a:ln>
+                <a:solidFill>
+                  <a:srgbClr val="F9F9F9"/>
+                </a:solidFill>
+                <a:effectLst>
+                  <a:innerShdw blurRad="50800" dist="25400" dir="13500000">
+                    <a:prstClr val="black">
+                      <a:alpha val="70000"/>
+                    </a:prstClr>
+                  </a:innerShdw>
+                </a:effectLst>
+                <a:latin typeface="+mj-lt"/>
+                <a:ea typeface="+mj-ea"/>
+                <a:cs typeface="+mj-cs"/>
+              </a:defRPr>
+            </a:lvl1pPr>
+          </a:lstStyle>
+          <a:p>
+            <a:pPr algn="ctr"/>
+            <a:r>
+              <a:rPr lang="en-US" sz="6000" dirty="0">
+                <a:solidFill>
+                  <a:srgbClr val="FFFFFF"/>
+                </a:solidFill>
+              </a:rPr>
+              <a:t>Precision</a:t>
+            </a:r>
+            <a:endParaRPr lang="en-US" sz="6000" dirty="0">
+              <a:solidFill>
+                <a:srgbClr val="FFFFFF"/>
+              </a:solidFill>
+            </a:endParaRPr>
+          </a:p>
+        </p:txBody>
+      </p:sp>
+    </p:spTree>
+    <p:extLst>
+      <p:ext uri="{BB962C8B-B14F-4D97-AF65-F5344CB8AC3E}">
+        <p14:creationId xmlns:p14="http://schemas.microsoft.com/office/powerpoint/2010/main" val="1340169019"/>
       </p:ext>
     </p:extLst>
   </p:cSld>

</xml_diff>